<commit_message>
added ppts day 2 modifications
</commit_message>
<xml_diff>
--- a/Day 2/Slides/5. Looping and Arrays/looping-and-arrays-slides.pptx
+++ b/Day 2/Slides/5. Looping and Arrays/looping-and-arrays-slides.pptx
@@ -5,27 +5,27 @@
     <p:sldMasterId id="2147483648" r:id="rId1"/>
   </p:sldMasterIdLst>
   <p:notesMasterIdLst>
-    <p:notesMasterId r:id="rId21"/>
+    <p:notesMasterId r:id="rId20"/>
   </p:notesMasterIdLst>
   <p:sldIdLst>
-    <p:sldId id="256" r:id="rId3"/>
-    <p:sldId id="257" r:id="rId4"/>
-    <p:sldId id="258" r:id="rId5"/>
-    <p:sldId id="259" r:id="rId6"/>
-    <p:sldId id="260" r:id="rId7"/>
-    <p:sldId id="261" r:id="rId8"/>
-    <p:sldId id="262" r:id="rId9"/>
-    <p:sldId id="263" r:id="rId10"/>
-    <p:sldId id="264" r:id="rId11"/>
-    <p:sldId id="265" r:id="rId12"/>
-    <p:sldId id="266" r:id="rId13"/>
-    <p:sldId id="267" r:id="rId14"/>
-    <p:sldId id="268" r:id="rId15"/>
-    <p:sldId id="269" r:id="rId16"/>
-    <p:sldId id="270" r:id="rId17"/>
-    <p:sldId id="271" r:id="rId18"/>
-    <p:sldId id="272" r:id="rId19"/>
-    <p:sldId id="273" r:id="rId20"/>
+    <p:sldId id="256" r:id="rId2"/>
+    <p:sldId id="257" r:id="rId3"/>
+    <p:sldId id="258" r:id="rId4"/>
+    <p:sldId id="259" r:id="rId5"/>
+    <p:sldId id="260" r:id="rId6"/>
+    <p:sldId id="261" r:id="rId7"/>
+    <p:sldId id="262" r:id="rId8"/>
+    <p:sldId id="263" r:id="rId9"/>
+    <p:sldId id="264" r:id="rId10"/>
+    <p:sldId id="265" r:id="rId11"/>
+    <p:sldId id="266" r:id="rId12"/>
+    <p:sldId id="267" r:id="rId13"/>
+    <p:sldId id="268" r:id="rId14"/>
+    <p:sldId id="269" r:id="rId15"/>
+    <p:sldId id="270" r:id="rId16"/>
+    <p:sldId id="271" r:id="rId17"/>
+    <p:sldId id="272" r:id="rId18"/>
+    <p:sldId id="273" r:id="rId19"/>
   </p:sldIdLst>
   <p:sldSz cx="12192000" cy="6858000"/>
   <p:notesSz cx="12192000" cy="6858000"/>
@@ -121,6 +121,22 @@
       </a:defRPr>
     </a:lvl9pPr>
   </p:defaultTextStyle>
+  <p:extLst>
+    <p:ext uri="{EFAFB233-063F-42B5-8137-9DF3F51BA10A}">
+      <p15:sldGuideLst xmlns:p15="http://schemas.microsoft.com/office/powerpoint/2012/main">
+        <p15:guide id="1" orient="horz" pos="2861">
+          <p15:clr>
+            <a:srgbClr val="A4A3A4"/>
+          </p15:clr>
+        </p15:guide>
+        <p15:guide id="2" pos="2189">
+          <p15:clr>
+            <a:srgbClr val="A4A3A4"/>
+          </p15:clr>
+        </p15:guide>
+      </p15:sldGuideLst>
+    </p:ext>
+  </p:extLst>
 </p:presentation>
 </file>
 
@@ -206,6 +222,7 @@
           <a:p>
             <a:fld id="{3EFD42F7-718C-4B98-AAEC-167E6DDD60A7}" type="datetimeFigureOut">
               <a:rPr lang="en-US" smtClean="0"/>
+              <a:t>6/24/2024</a:t>
             </a:fld>
             <a:endParaRPr lang="en-US"/>
           </a:p>
@@ -269,42 +286,37 @@
           <a:p>
             <a:pPr lvl="0"/>
             <a:r>
-              <a:rPr lang="en-US" smtClean="0"/>
+              <a:rPr lang="en-US"/>
               <a:t>Click to edit Master text styles</a:t>
             </a:r>
-            <a:endParaRPr lang="en-US" smtClean="0"/>
           </a:p>
           <a:p>
             <a:pPr lvl="1"/>
             <a:r>
-              <a:rPr lang="en-US" smtClean="0"/>
+              <a:rPr lang="en-US"/>
               <a:t>Second level</a:t>
             </a:r>
-            <a:endParaRPr lang="en-US" smtClean="0"/>
           </a:p>
           <a:p>
             <a:pPr lvl="2"/>
             <a:r>
-              <a:rPr lang="en-US" smtClean="0"/>
+              <a:rPr lang="en-US"/>
               <a:t>Third level</a:t>
             </a:r>
-            <a:endParaRPr lang="en-US" smtClean="0"/>
           </a:p>
           <a:p>
             <a:pPr lvl="3"/>
             <a:r>
-              <a:rPr lang="en-US" smtClean="0"/>
+              <a:rPr lang="en-US"/>
               <a:t>Fourth level</a:t>
             </a:r>
-            <a:endParaRPr lang="en-US" smtClean="0"/>
           </a:p>
           <a:p>
             <a:pPr lvl="4"/>
             <a:r>
-              <a:rPr lang="en-US" smtClean="0"/>
+              <a:rPr lang="en-US"/>
               <a:t>Fifth level</a:t>
             </a:r>
-            <a:endParaRPr lang="en-US"/>
           </a:p>
         </p:txBody>
       </p:sp>
@@ -368,6 +380,7 @@
           <a:p>
             <a:fld id="{21B2AA4F-B828-4D7C-AFD3-893933DAFCB4}" type="slidenum">
               <a:rPr lang="en-US" smtClean="0"/>
+              <a:t>‹#›</a:t>
             </a:fld>
             <a:endParaRPr lang="en-US"/>
           </a:p>
@@ -516,7 +529,9 @@
               <a:defRPr/>
             </a:lvl1pPr>
           </a:lstStyle>
-          <a:p/>
+          <a:p>
+            <a:endParaRPr/>
+          </a:p>
         </p:txBody>
       </p:sp>
       <p:sp>
@@ -547,7 +562,9 @@
               <a:defRPr/>
             </a:lvl1pPr>
           </a:lstStyle>
-          <a:p/>
+          <a:p>
+            <a:endParaRPr/>
+          </a:p>
         </p:txBody>
       </p:sp>
       <p:sp>
@@ -574,7 +591,9 @@
               </a:defRPr>
             </a:lvl1pPr>
           </a:lstStyle>
-          <a:p/>
+          <a:p>
+            <a:endParaRPr/>
+          </a:p>
         </p:txBody>
       </p:sp>
       <p:sp>
@@ -604,6 +623,7 @@
           <a:p>
             <a:fld id="{1D8BD707-D9CF-40AE-B4C6-C98DA3205C09}" type="datetimeFigureOut">
               <a:rPr lang="en-US"/>
+              <a:t>6/24/2024</a:t>
             </a:fld>
             <a:endParaRPr lang="en-US"/>
           </a:p>
@@ -636,6 +656,7 @@
           <a:p>
             <a:fld id="{B6F15528-21DE-4FAA-801E-634DDDAF4B2B}" type="slidenum">
               <a:rPr/>
+              <a:t>‹#›</a:t>
             </a:fld>
             <a:endParaRPr/>
           </a:p>
@@ -651,7 +672,7 @@
 </file>
 
 <file path=ppt/slideLayouts/slideLayout2.xml><?xml version="1.0" encoding="utf-8"?>
-<p:sldLayout xmlns:a="http://schemas.openxmlformats.org/drawingml/2006/main" xmlns:r="http://schemas.openxmlformats.org/officeDocument/2006/relationships" xmlns:p="http://schemas.openxmlformats.org/presentationml/2006/main" type="obj" preserve="1" showMasterSp="0">
+<p:sldLayout xmlns:a="http://schemas.openxmlformats.org/drawingml/2006/main" xmlns:r="http://schemas.openxmlformats.org/officeDocument/2006/relationships" xmlns:p="http://schemas.openxmlformats.org/presentationml/2006/main" showMasterSp="0" type="obj" preserve="1">
   <p:cSld name="Title and Content">
     <p:bg>
       <p:bgPr>
@@ -720,7 +741,9 @@
         <p:txBody>
           <a:bodyPr wrap="square" lIns="0" tIns="0" rIns="0" bIns="0" rtlCol="0"/>
           <a:lstStyle/>
-          <a:p/>
+          <a:p>
+            <a:endParaRPr/>
+          </a:p>
         </p:txBody>
       </p:sp>
       <p:sp>
@@ -747,7 +770,9 @@
               </a:defRPr>
             </a:lvl1pPr>
           </a:lstStyle>
-          <a:p/>
+          <a:p>
+            <a:endParaRPr/>
+          </a:p>
         </p:txBody>
       </p:sp>
       <p:sp>
@@ -768,7 +793,9 @@
               <a:defRPr/>
             </a:lvl1pPr>
           </a:lstStyle>
-          <a:p/>
+          <a:p>
+            <a:endParaRPr/>
+          </a:p>
         </p:txBody>
       </p:sp>
       <p:sp>
@@ -795,7 +822,9 @@
               </a:defRPr>
             </a:lvl1pPr>
           </a:lstStyle>
-          <a:p/>
+          <a:p>
+            <a:endParaRPr/>
+          </a:p>
         </p:txBody>
       </p:sp>
       <p:sp>
@@ -825,6 +854,7 @@
           <a:p>
             <a:fld id="{1D8BD707-D9CF-40AE-B4C6-C98DA3205C09}" type="datetimeFigureOut">
               <a:rPr lang="en-US"/>
+              <a:t>6/24/2024</a:t>
             </a:fld>
             <a:endParaRPr lang="en-US"/>
           </a:p>
@@ -857,6 +887,7 @@
           <a:p>
             <a:fld id="{B6F15528-21DE-4FAA-801E-634DDDAF4B2B}" type="slidenum">
               <a:rPr/>
+              <a:t>‹#›</a:t>
             </a:fld>
             <a:endParaRPr/>
           </a:p>
@@ -912,7 +943,9 @@
               </a:defRPr>
             </a:lvl1pPr>
           </a:lstStyle>
-          <a:p/>
+          <a:p>
+            <a:endParaRPr/>
+          </a:p>
         </p:txBody>
       </p:sp>
       <p:sp>
@@ -943,7 +976,9 @@
               <a:defRPr/>
             </a:lvl1pPr>
           </a:lstStyle>
-          <a:p/>
+          <a:p>
+            <a:endParaRPr/>
+          </a:p>
         </p:txBody>
       </p:sp>
       <p:sp>
@@ -974,7 +1009,9 @@
               <a:defRPr/>
             </a:lvl1pPr>
           </a:lstStyle>
-          <a:p/>
+          <a:p>
+            <a:endParaRPr/>
+          </a:p>
         </p:txBody>
       </p:sp>
       <p:sp>
@@ -1001,7 +1038,9 @@
               </a:defRPr>
             </a:lvl1pPr>
           </a:lstStyle>
-          <a:p/>
+          <a:p>
+            <a:endParaRPr/>
+          </a:p>
         </p:txBody>
       </p:sp>
       <p:sp>
@@ -1031,6 +1070,7 @@
           <a:p>
             <a:fld id="{1D8BD707-D9CF-40AE-B4C6-C98DA3205C09}" type="datetimeFigureOut">
               <a:rPr lang="en-US"/>
+              <a:t>6/24/2024</a:t>
             </a:fld>
             <a:endParaRPr lang="en-US"/>
           </a:p>
@@ -1063,6 +1103,7 @@
           <a:p>
             <a:fld id="{B6F15528-21DE-4FAA-801E-634DDDAF4B2B}" type="slidenum">
               <a:rPr/>
+              <a:t>‹#›</a:t>
             </a:fld>
             <a:endParaRPr/>
           </a:p>
@@ -1118,7 +1159,9 @@
               </a:defRPr>
             </a:lvl1pPr>
           </a:lstStyle>
-          <a:p/>
+          <a:p>
+            <a:endParaRPr/>
+          </a:p>
         </p:txBody>
       </p:sp>
       <p:sp>
@@ -1145,7 +1188,9 @@
               </a:defRPr>
             </a:lvl1pPr>
           </a:lstStyle>
-          <a:p/>
+          <a:p>
+            <a:endParaRPr/>
+          </a:p>
         </p:txBody>
       </p:sp>
       <p:sp>
@@ -1175,6 +1220,7 @@
           <a:p>
             <a:fld id="{1D8BD707-D9CF-40AE-B4C6-C98DA3205C09}" type="datetimeFigureOut">
               <a:rPr lang="en-US"/>
+              <a:t>6/24/2024</a:t>
             </a:fld>
             <a:endParaRPr lang="en-US"/>
           </a:p>
@@ -1207,6 +1253,7 @@
           <a:p>
             <a:fld id="{B6F15528-21DE-4FAA-801E-634DDDAF4B2B}" type="slidenum">
               <a:rPr/>
+              <a:t>‹#›</a:t>
             </a:fld>
             <a:endParaRPr/>
           </a:p>
@@ -1262,7 +1309,9 @@
               </a:defRPr>
             </a:lvl1pPr>
           </a:lstStyle>
-          <a:p/>
+          <a:p>
+            <a:endParaRPr/>
+          </a:p>
         </p:txBody>
       </p:sp>
       <p:sp>
@@ -1292,6 +1341,7 @@
           <a:p>
             <a:fld id="{1D8BD707-D9CF-40AE-B4C6-C98DA3205C09}" type="datetimeFigureOut">
               <a:rPr lang="en-US"/>
+              <a:t>6/24/2024</a:t>
             </a:fld>
             <a:endParaRPr lang="en-US"/>
           </a:p>
@@ -1324,6 +1374,7 @@
           <a:p>
             <a:fld id="{B6F15528-21DE-4FAA-801E-634DDDAF4B2B}" type="slidenum">
               <a:rPr/>
+              <a:t>‹#›</a:t>
             </a:fld>
             <a:endParaRPr/>
           </a:p>
@@ -1397,7 +1448,9 @@
               </a:defRPr>
             </a:lvl1pPr>
           </a:lstStyle>
-          <a:p/>
+          <a:p>
+            <a:endParaRPr/>
+          </a:p>
         </p:txBody>
       </p:sp>
       <p:sp>
@@ -1428,7 +1481,9 @@
               <a:defRPr/>
             </a:lvl1pPr>
           </a:lstStyle>
-          <a:p/>
+          <a:p>
+            <a:endParaRPr/>
+          </a:p>
         </p:txBody>
       </p:sp>
       <p:sp>
@@ -1465,7 +1520,9 @@
               </a:defRPr>
             </a:lvl1pPr>
           </a:lstStyle>
-          <a:p/>
+          <a:p>
+            <a:endParaRPr/>
+          </a:p>
         </p:txBody>
       </p:sp>
       <p:sp>
@@ -1505,6 +1562,7 @@
           <a:p>
             <a:fld id="{1D8BD707-D9CF-40AE-B4C6-C98DA3205C09}" type="datetimeFigureOut">
               <a:rPr lang="en-US"/>
+              <a:t>6/24/2024</a:t>
             </a:fld>
             <a:endParaRPr lang="en-US"/>
           </a:p>
@@ -1547,6 +1605,7 @@
           <a:p>
             <a:fld id="{B6F15528-21DE-4FAA-801E-634DDDAF4B2B}" type="slidenum">
               <a:rPr/>
+              <a:t>‹#›</a:t>
             </a:fld>
             <a:endParaRPr/>
           </a:p>
@@ -1731,7 +1790,7 @@
           <p:nvPr/>
         </p:nvPicPr>
         <p:blipFill>
-          <a:blip r:embed="rId1" cstate="print"/>
+          <a:blip r:embed="rId2" cstate="print"/>
           <a:stretch>
             <a:fillRect/>
           </a:stretch>
@@ -1753,7 +1812,7 @@
           <p:nvPr/>
         </p:nvPicPr>
         <p:blipFill>
-          <a:blip r:embed="rId2" cstate="print"/>
+          <a:blip r:embed="rId3" cstate="print"/>
           <a:stretch>
             <a:fillRect/>
           </a:stretch>
@@ -1781,9 +1840,11 @@
         <p:spPr/>
         <p:txBody>
           <a:bodyPr/>
+          <a:lstStyle/>
           <a:p>
             <a:fld id="{B6F15528-21DE-4FAA-801E-634DDDAF4B2B}" type="slidenum">
               <a:rPr/>
+              <a:t>1</a:t>
             </a:fld>
             <a:endParaRPr/>
           </a:p>
@@ -1859,7 +1920,9 @@
         <p:txBody>
           <a:bodyPr wrap="square" lIns="0" tIns="0" rIns="0" bIns="0" rtlCol="0"/>
           <a:lstStyle/>
-          <a:p/>
+          <a:p>
+            <a:endParaRPr/>
+          </a:p>
         </p:txBody>
       </p:sp>
       <p:pic>
@@ -1869,7 +1932,7 @@
           <p:nvPr/>
         </p:nvPicPr>
         <p:blipFill>
-          <a:blip r:embed="rId1" cstate="print"/>
+          <a:blip r:embed="rId2" cstate="print"/>
           <a:stretch>
             <a:fillRect/>
           </a:stretch>
@@ -1941,7 +2004,9 @@
         <p:txBody>
           <a:bodyPr wrap="square" lIns="0" tIns="0" rIns="0" bIns="0" rtlCol="0"/>
           <a:lstStyle/>
-          <a:p/>
+          <a:p>
+            <a:endParaRPr/>
+          </a:p>
         </p:txBody>
       </p:sp>
       <p:sp>
@@ -2001,7 +2066,9 @@
         <p:txBody>
           <a:bodyPr wrap="square" lIns="0" tIns="0" rIns="0" bIns="0" rtlCol="0"/>
           <a:lstStyle/>
-          <a:p/>
+          <a:p>
+            <a:endParaRPr/>
+          </a:p>
         </p:txBody>
       </p:sp>
       <p:sp>
@@ -2346,7 +2413,7 @@
           <p:nvPr/>
         </p:nvPicPr>
         <p:blipFill>
-          <a:blip r:embed="rId2" cstate="print"/>
+          <a:blip r:embed="rId3" cstate="print"/>
           <a:stretch>
             <a:fillRect/>
           </a:stretch>
@@ -2368,7 +2435,7 @@
           <p:nvPr/>
         </p:nvPicPr>
         <p:blipFill>
-          <a:blip r:embed="rId3" cstate="print"/>
+          <a:blip r:embed="rId4" cstate="print"/>
           <a:stretch>
             <a:fillRect/>
           </a:stretch>
@@ -2660,7 +2727,7 @@
           <p:nvPr/>
         </p:nvPicPr>
         <p:blipFill>
-          <a:blip r:embed="rId4" cstate="print"/>
+          <a:blip r:embed="rId5" cstate="print"/>
           <a:stretch>
             <a:fillRect/>
           </a:stretch>
@@ -2688,9 +2755,11 @@
         <p:spPr/>
         <p:txBody>
           <a:bodyPr/>
+          <a:lstStyle/>
           <a:p>
             <a:fld id="{B6F15528-21DE-4FAA-801E-634DDDAF4B2B}" type="slidenum">
               <a:rPr/>
+              <a:t>10</a:t>
             </a:fld>
             <a:endParaRPr/>
           </a:p>
@@ -2766,7 +2835,9 @@
         <p:txBody>
           <a:bodyPr wrap="square" lIns="0" tIns="0" rIns="0" bIns="0" rtlCol="0"/>
           <a:lstStyle/>
-          <a:p/>
+          <a:p>
+            <a:endParaRPr/>
+          </a:p>
         </p:txBody>
       </p:sp>
       <p:sp>
@@ -3156,7 +3227,7 @@
           <p:nvPr/>
         </p:nvPicPr>
         <p:blipFill>
-          <a:blip r:embed="rId1" cstate="print"/>
+          <a:blip r:embed="rId2" cstate="print"/>
           <a:stretch>
             <a:fillRect/>
           </a:stretch>
@@ -3178,7 +3249,7 @@
           <p:nvPr/>
         </p:nvPicPr>
         <p:blipFill>
-          <a:blip r:embed="rId2" cstate="print"/>
+          <a:blip r:embed="rId3" cstate="print"/>
           <a:stretch>
             <a:fillRect/>
           </a:stretch>
@@ -3294,7 +3365,7 @@
           <p:nvPr/>
         </p:nvPicPr>
         <p:blipFill>
-          <a:blip r:embed="rId3" cstate="print"/>
+          <a:blip r:embed="rId4" cstate="print"/>
           <a:stretch>
             <a:fillRect/>
           </a:stretch>
@@ -3330,7 +3401,7 @@
             <p:nvPr/>
           </p:nvPicPr>
           <p:blipFill>
-            <a:blip r:embed="rId4" cstate="print"/>
+            <a:blip r:embed="rId5" cstate="print"/>
             <a:stretch>
               <a:fillRect/>
             </a:stretch>
@@ -3352,7 +3423,7 @@
             <p:nvPr/>
           </p:nvPicPr>
           <p:blipFill>
-            <a:blip r:embed="rId5" cstate="print"/>
+            <a:blip r:embed="rId6" cstate="print"/>
             <a:stretch>
               <a:fillRect/>
             </a:stretch>
@@ -3374,7 +3445,7 @@
             <p:nvPr/>
           </p:nvPicPr>
           <p:blipFill>
-            <a:blip r:embed="rId6" cstate="print"/>
+            <a:blip r:embed="rId7" cstate="print"/>
             <a:stretch>
               <a:fillRect/>
             </a:stretch>
@@ -3396,7 +3467,7 @@
             <p:nvPr/>
           </p:nvPicPr>
           <p:blipFill>
-            <a:blip r:embed="rId5" cstate="print"/>
+            <a:blip r:embed="rId6" cstate="print"/>
             <a:stretch>
               <a:fillRect/>
             </a:stretch>
@@ -3418,7 +3489,7 @@
             <p:nvPr/>
           </p:nvPicPr>
           <p:blipFill>
-            <a:blip r:embed="rId7" cstate="print"/>
+            <a:blip r:embed="rId8" cstate="print"/>
             <a:stretch>
               <a:fillRect/>
             </a:stretch>
@@ -3441,7 +3512,7 @@
           <p:nvPr/>
         </p:nvPicPr>
         <p:blipFill>
-          <a:blip r:embed="rId8" cstate="print"/>
+          <a:blip r:embed="rId9" cstate="print"/>
           <a:stretch>
             <a:fillRect/>
           </a:stretch>
@@ -3512,7 +3583,7 @@
         </p:nvGraphicFramePr>
         <p:xfrm>
           <a:off x="7824216" y="1719072"/>
-          <a:ext cx="3557904" cy="638810"/>
+          <a:ext cx="3519170" cy="612648"/>
         </p:xfrm>
         <a:graphic>
           <a:graphicData uri="http://schemas.openxmlformats.org/drawingml/2006/table">
@@ -3521,9 +3592,27 @@
                 <a:tableStyleId>{2D5ABB26-0587-4C30-8999-92F81FD0307C}</a:tableStyleId>
               </a:tblPr>
               <a:tblGrid>
-                <a:gridCol w="1169670"/>
-                <a:gridCol w="1179830"/>
-                <a:gridCol w="1169670"/>
+                <a:gridCol w="1169670">
+                  <a:extLst>
+                    <a:ext uri="{9D8B030D-6E8A-4147-A177-3AD203B41FA5}">
+                      <a16:colId xmlns:a16="http://schemas.microsoft.com/office/drawing/2014/main" val="20000"/>
+                    </a:ext>
+                  </a:extLst>
+                </a:gridCol>
+                <a:gridCol w="1179830">
+                  <a:extLst>
+                    <a:ext uri="{9D8B030D-6E8A-4147-A177-3AD203B41FA5}">
+                      <a16:colId xmlns:a16="http://schemas.microsoft.com/office/drawing/2014/main" val="20001"/>
+                    </a:ext>
+                  </a:extLst>
+                </a:gridCol>
+                <a:gridCol w="1169670">
+                  <a:extLst>
+                    <a:ext uri="{9D8B030D-6E8A-4147-A177-3AD203B41FA5}">
+                      <a16:colId xmlns:a16="http://schemas.microsoft.com/office/drawing/2014/main" val="20002"/>
+                    </a:ext>
+                  </a:extLst>
+                </a:gridCol>
               </a:tblGrid>
               <a:tr h="612648">
                 <a:tc>
@@ -3703,6 +3792,11 @@
                     </a:solidFill>
                   </a:tcPr>
                 </a:tc>
+                <a:extLst>
+                  <a:ext uri="{0D108BD9-81ED-4DB2-BD59-A6C34878D82A}">
+                    <a16:rowId xmlns:a16="http://schemas.microsoft.com/office/drawing/2014/main" val="10000"/>
+                  </a:ext>
+                </a:extLst>
               </a:tr>
             </a:tbl>
           </a:graphicData>
@@ -3891,7 +3985,9 @@
         <p:txBody>
           <a:bodyPr wrap="square" lIns="0" tIns="0" rIns="0" bIns="0" rtlCol="0"/>
           <a:lstStyle/>
-          <a:p/>
+          <a:p>
+            <a:endParaRPr/>
+          </a:p>
         </p:txBody>
       </p:sp>
       <p:sp>
@@ -3907,9 +4003,11 @@
         <p:spPr/>
         <p:txBody>
           <a:bodyPr/>
+          <a:lstStyle/>
           <a:p>
             <a:fld id="{B6F15528-21DE-4FAA-801E-634DDDAF4B2B}" type="slidenum">
               <a:rPr/>
+              <a:t>11</a:t>
             </a:fld>
             <a:endParaRPr/>
           </a:p>
@@ -3985,31 +4083,11 @@
         <p:txBody>
           <a:bodyPr wrap="square" lIns="0" tIns="0" rIns="0" bIns="0" rtlCol="0"/>
           <a:lstStyle/>
-          <a:p/>
+          <a:p>
+            <a:endParaRPr/>
+          </a:p>
         </p:txBody>
       </p:sp>
-      <p:pic>
-        <p:nvPicPr>
-          <p:cNvPr id="3" name="object 3"/>
-          <p:cNvPicPr/>
-          <p:nvPr/>
-        </p:nvPicPr>
-        <p:blipFill>
-          <a:blip r:embed="rId1" cstate="print"/>
-          <a:stretch>
-            <a:fillRect/>
-          </a:stretch>
-        </p:blipFill>
-        <p:spPr>
-          <a:xfrm>
-            <a:off x="11484864" y="6149340"/>
-            <a:ext cx="451103" cy="449580"/>
-          </a:xfrm>
-          <a:prstGeom prst="rect">
-            <a:avLst/>
-          </a:prstGeom>
-        </p:spPr>
-      </p:pic>
       <p:sp>
         <p:nvSpPr>
           <p:cNvPr id="4" name="object 4"/>
@@ -4126,7 +4204,7 @@
         </p:nvGraphicFramePr>
         <p:xfrm>
           <a:off x="343154" y="2379231"/>
-          <a:ext cx="2961005" cy="1402715"/>
+          <a:ext cx="2959735" cy="1402538"/>
         </p:xfrm>
         <a:graphic>
           <a:graphicData uri="http://schemas.openxmlformats.org/drawingml/2006/table">
@@ -4135,9 +4213,27 @@
                 <a:tableStyleId>{2D5ABB26-0587-4C30-8999-92F81FD0307C}</a:tableStyleId>
               </a:tblPr>
               <a:tblGrid>
-                <a:gridCol w="1631950"/>
-                <a:gridCol w="304800"/>
-                <a:gridCol w="1022985"/>
+                <a:gridCol w="1631950">
+                  <a:extLst>
+                    <a:ext uri="{9D8B030D-6E8A-4147-A177-3AD203B41FA5}">
+                      <a16:colId xmlns:a16="http://schemas.microsoft.com/office/drawing/2014/main" val="20000"/>
+                    </a:ext>
+                  </a:extLst>
+                </a:gridCol>
+                <a:gridCol w="304800">
+                  <a:extLst>
+                    <a:ext uri="{9D8B030D-6E8A-4147-A177-3AD203B41FA5}">
+                      <a16:colId xmlns:a16="http://schemas.microsoft.com/office/drawing/2014/main" val="20001"/>
+                    </a:ext>
+                  </a:extLst>
+                </a:gridCol>
+                <a:gridCol w="1022985">
+                  <a:extLst>
+                    <a:ext uri="{9D8B030D-6E8A-4147-A177-3AD203B41FA5}">
+                      <a16:colId xmlns:a16="http://schemas.microsoft.com/office/drawing/2014/main" val="20002"/>
+                    </a:ext>
+                  </a:extLst>
+                </a:gridCol>
               </a:tblGrid>
               <a:tr h="434528">
                 <a:tc>
@@ -4255,6 +4351,11 @@
                     </a:solidFill>
                   </a:tcPr>
                 </a:tc>
+                <a:extLst>
+                  <a:ext uri="{0D108BD9-81ED-4DB2-BD59-A6C34878D82A}">
+                    <a16:rowId xmlns:a16="http://schemas.microsoft.com/office/drawing/2014/main" val="10000"/>
+                  </a:ext>
+                </a:extLst>
               </a:tr>
               <a:tr h="533240">
                 <a:tc>
@@ -4372,6 +4473,11 @@
                     </a:solidFill>
                   </a:tcPr>
                 </a:tc>
+                <a:extLst>
+                  <a:ext uri="{0D108BD9-81ED-4DB2-BD59-A6C34878D82A}">
+                    <a16:rowId xmlns:a16="http://schemas.microsoft.com/office/drawing/2014/main" val="10001"/>
+                  </a:ext>
+                </a:extLst>
               </a:tr>
               <a:tr h="434770">
                 <a:tc>
@@ -4489,6 +4595,11 @@
                     </a:solidFill>
                   </a:tcPr>
                 </a:tc>
+                <a:extLst>
+                  <a:ext uri="{0D108BD9-81ED-4DB2-BD59-A6C34878D82A}">
+                    <a16:rowId xmlns:a16="http://schemas.microsoft.com/office/drawing/2014/main" val="10002"/>
+                  </a:ext>
+                </a:extLst>
               </a:tr>
             </a:tbl>
           </a:graphicData>
@@ -4593,7 +4704,7 @@
               </a:rPr>
               <a:t>0.0f;</a:t>
             </a:r>
-            <a:endParaRPr sz="2000">
+            <a:endParaRPr sz="2000" dirty="0">
               <a:latin typeface="Courier New" panose="02070309020205020404"/>
               <a:cs typeface="Courier New" panose="02070309020205020404"/>
             </a:endParaRPr>
@@ -4797,7 +4908,7 @@
               </a:rPr>
               <a:t>++)</a:t>
             </a:r>
-            <a:endParaRPr sz="2000">
+            <a:endParaRPr sz="2000" dirty="0">
               <a:latin typeface="Courier New" panose="02070309020205020404"/>
               <a:cs typeface="Courier New" panose="02070309020205020404"/>
             </a:endParaRPr>
@@ -4894,7 +5005,7 @@
               </a:rPr>
               <a:t>System.out.println(sum); // displays 45</a:t>
             </a:r>
-            <a:endParaRPr sz="2000">
+            <a:endParaRPr sz="2000" dirty="0">
               <a:latin typeface="Courier New" panose="02070309020205020404"/>
               <a:cs typeface="Courier New" panose="02070309020205020404"/>
             </a:endParaRPr>
@@ -4925,68 +5036,6 @@
       </p:pic>
       <p:sp>
         <p:nvSpPr>
-          <p:cNvPr id="8" name="object 8"/>
-          <p:cNvSpPr/>
-          <p:nvPr/>
-        </p:nvSpPr>
-        <p:spPr>
-          <a:xfrm>
-            <a:off x="4123944" y="5603747"/>
-            <a:ext cx="2268220" cy="321945"/>
-          </a:xfrm>
-          <a:custGeom>
-            <a:avLst/>
-            <a:gdLst/>
-            <a:ahLst/>
-            <a:cxnLst/>
-            <a:rect l="l" t="t" r="r" b="b"/>
-            <a:pathLst>
-              <a:path w="2268220" h="321945">
-                <a:moveTo>
-                  <a:pt x="2267712" y="0"/>
-                </a:moveTo>
-                <a:lnTo>
-                  <a:pt x="0" y="0"/>
-                </a:lnTo>
-                <a:lnTo>
-                  <a:pt x="0" y="321563"/>
-                </a:lnTo>
-                <a:lnTo>
-                  <a:pt x="2267712" y="321563"/>
-                </a:lnTo>
-                <a:lnTo>
-                  <a:pt x="2267712" y="0"/>
-                </a:lnTo>
-                <a:close/>
-              </a:path>
-            </a:pathLst>
-          </a:custGeom>
-          <a:solidFill>
-            <a:srgbClr val="171717"/>
-          </a:solidFill>
-        </p:spPr>
-        <p:txBody>
-          <a:bodyPr wrap="square" lIns="0" tIns="0" rIns="0" bIns="0" rtlCol="0"/>
-          <a:lstStyle/>
-          <a:p>
-            <a:r>
-              <a:rPr lang="en-US">
-                <a:solidFill>
-                  <a:srgbClr val="FF0000"/>
-                </a:solidFill>
-              </a:rPr>
-              <a:t>//display 45</a:t>
-            </a:r>
-            <a:endParaRPr lang="en-US">
-              <a:solidFill>
-                <a:srgbClr val="FF0000"/>
-              </a:solidFill>
-            </a:endParaRPr>
-          </a:p>
-        </p:txBody>
-      </p:sp>
-      <p:sp>
-        <p:nvSpPr>
           <p:cNvPr id="9" name="Slide Number Placeholder 8"/>
           <p:cNvSpPr>
             <a:spLocks noGrp="1"/>
@@ -4998,9 +5047,11 @@
         <p:spPr/>
         <p:txBody>
           <a:bodyPr/>
+          <a:lstStyle/>
           <a:p>
             <a:fld id="{B6F15528-21DE-4FAA-801E-634DDDAF4B2B}" type="slidenum">
               <a:rPr/>
+              <a:t>12</a:t>
             </a:fld>
             <a:endParaRPr/>
           </a:p>
@@ -5116,11 +5167,6 @@
               </a:rPr>
               <a:t>;</a:t>
             </a:r>
-            <a:endParaRPr spc="-5" dirty="0">
-              <a:solidFill>
-                <a:srgbClr val="FFFFFF"/>
-              </a:solidFill>
-            </a:endParaRPr>
           </a:p>
         </p:txBody>
       </p:sp>
@@ -5134,7 +5180,7 @@
         </p:nvGraphicFramePr>
         <p:xfrm>
           <a:off x="343154" y="2379231"/>
-          <a:ext cx="2961005" cy="1402715"/>
+          <a:ext cx="2959735" cy="1402538"/>
         </p:xfrm>
         <a:graphic>
           <a:graphicData uri="http://schemas.openxmlformats.org/drawingml/2006/table">
@@ -5143,9 +5189,27 @@
                 <a:tableStyleId>{2D5ABB26-0587-4C30-8999-92F81FD0307C}</a:tableStyleId>
               </a:tblPr>
               <a:tblGrid>
-                <a:gridCol w="1631950"/>
-                <a:gridCol w="304800"/>
-                <a:gridCol w="1022985"/>
+                <a:gridCol w="1631950">
+                  <a:extLst>
+                    <a:ext uri="{9D8B030D-6E8A-4147-A177-3AD203B41FA5}">
+                      <a16:colId xmlns:a16="http://schemas.microsoft.com/office/drawing/2014/main" val="20000"/>
+                    </a:ext>
+                  </a:extLst>
+                </a:gridCol>
+                <a:gridCol w="304800">
+                  <a:extLst>
+                    <a:ext uri="{9D8B030D-6E8A-4147-A177-3AD203B41FA5}">
+                      <a16:colId xmlns:a16="http://schemas.microsoft.com/office/drawing/2014/main" val="20001"/>
+                    </a:ext>
+                  </a:extLst>
+                </a:gridCol>
+                <a:gridCol w="1022985">
+                  <a:extLst>
+                    <a:ext uri="{9D8B030D-6E8A-4147-A177-3AD203B41FA5}">
+                      <a16:colId xmlns:a16="http://schemas.microsoft.com/office/drawing/2014/main" val="20002"/>
+                    </a:ext>
+                  </a:extLst>
+                </a:gridCol>
               </a:tblGrid>
               <a:tr h="434528">
                 <a:tc>
@@ -5263,6 +5327,11 @@
                     </a:solidFill>
                   </a:tcPr>
                 </a:tc>
+                <a:extLst>
+                  <a:ext uri="{0D108BD9-81ED-4DB2-BD59-A6C34878D82A}">
+                    <a16:rowId xmlns:a16="http://schemas.microsoft.com/office/drawing/2014/main" val="10000"/>
+                  </a:ext>
+                </a:extLst>
               </a:tr>
               <a:tr h="533240">
                 <a:tc>
@@ -5380,6 +5449,11 @@
                     </a:solidFill>
                   </a:tcPr>
                 </a:tc>
+                <a:extLst>
+                  <a:ext uri="{0D108BD9-81ED-4DB2-BD59-A6C34878D82A}">
+                    <a16:rowId xmlns:a16="http://schemas.microsoft.com/office/drawing/2014/main" val="10001"/>
+                  </a:ext>
+                </a:extLst>
               </a:tr>
               <a:tr h="434770">
                 <a:tc>
@@ -5497,6 +5571,11 @@
                     </a:solidFill>
                   </a:tcPr>
                 </a:tc>
+                <a:extLst>
+                  <a:ext uri="{0D108BD9-81ED-4DB2-BD59-A6C34878D82A}">
+                    <a16:rowId xmlns:a16="http://schemas.microsoft.com/office/drawing/2014/main" val="10002"/>
+                  </a:ext>
+                </a:extLst>
               </a:tr>
             </a:tbl>
           </a:graphicData>
@@ -6063,7 +6142,7 @@
           <p:nvPr/>
         </p:nvPicPr>
         <p:blipFill>
-          <a:blip r:embed="rId1" cstate="print"/>
+          <a:blip r:embed="rId2" cstate="print"/>
           <a:stretch>
             <a:fillRect/>
           </a:stretch>
@@ -6123,7 +6202,9 @@
         <p:txBody>
           <a:bodyPr wrap="square" lIns="0" tIns="0" rIns="0" bIns="0" rtlCol="0"/>
           <a:lstStyle/>
-          <a:p/>
+          <a:p>
+            <a:endParaRPr/>
+          </a:p>
         </p:txBody>
       </p:sp>
       <p:sp>
@@ -6173,7 +6254,9 @@
         <p:txBody>
           <a:bodyPr wrap="square" lIns="0" tIns="0" rIns="0" bIns="0" rtlCol="0"/>
           <a:lstStyle/>
-          <a:p/>
+          <a:p>
+            <a:endParaRPr/>
+          </a:p>
         </p:txBody>
       </p:sp>
       <p:sp>
@@ -6223,7 +6306,9 @@
         <p:txBody>
           <a:bodyPr wrap="square" lIns="0" tIns="0" rIns="0" bIns="0" rtlCol="0"/>
           <a:lstStyle/>
-          <a:p/>
+          <a:p>
+            <a:endParaRPr/>
+          </a:p>
         </p:txBody>
       </p:sp>
       <p:sp>
@@ -6273,7 +6358,9 @@
         <p:txBody>
           <a:bodyPr wrap="square" lIns="0" tIns="0" rIns="0" bIns="0" rtlCol="0"/>
           <a:lstStyle/>
-          <a:p/>
+          <a:p>
+            <a:endParaRPr/>
+          </a:p>
         </p:txBody>
       </p:sp>
       <p:sp>
@@ -6289,9 +6376,11 @@
         <p:spPr/>
         <p:txBody>
           <a:bodyPr/>
+          <a:lstStyle/>
           <a:p>
             <a:fld id="{B6F15528-21DE-4FAA-801E-634DDDAF4B2B}" type="slidenum">
               <a:rPr/>
+              <a:t>13</a:t>
             </a:fld>
             <a:endParaRPr/>
           </a:p>
@@ -6367,31 +6456,11 @@
         <p:txBody>
           <a:bodyPr wrap="square" lIns="0" tIns="0" rIns="0" bIns="0" rtlCol="0"/>
           <a:lstStyle/>
-          <a:p/>
+          <a:p>
+            <a:endParaRPr/>
+          </a:p>
         </p:txBody>
       </p:sp>
-      <p:pic>
-        <p:nvPicPr>
-          <p:cNvPr id="3" name="object 3"/>
-          <p:cNvPicPr/>
-          <p:nvPr/>
-        </p:nvPicPr>
-        <p:blipFill>
-          <a:blip r:embed="rId1" cstate="print"/>
-          <a:stretch>
-            <a:fillRect/>
-          </a:stretch>
-        </p:blipFill>
-        <p:spPr>
-          <a:xfrm>
-            <a:off x="11484864" y="6149340"/>
-            <a:ext cx="451103" cy="449580"/>
-          </a:xfrm>
-          <a:prstGeom prst="rect">
-            <a:avLst/>
-          </a:prstGeom>
-        </p:spPr>
-      </p:pic>
       <p:sp>
         <p:nvSpPr>
           <p:cNvPr id="4" name="object 4"/>
@@ -6508,7 +6577,7 @@
         </p:nvGraphicFramePr>
         <p:xfrm>
           <a:off x="326897" y="2379231"/>
-          <a:ext cx="2976880" cy="1465580"/>
+          <a:ext cx="2976245" cy="1465057"/>
         </p:xfrm>
         <a:graphic>
           <a:graphicData uri="http://schemas.openxmlformats.org/drawingml/2006/table">
@@ -6517,9 +6586,27 @@
                 <a:tableStyleId>{2D5ABB26-0587-4C30-8999-92F81FD0307C}</a:tableStyleId>
               </a:tblPr>
               <a:tblGrid>
-                <a:gridCol w="1648460"/>
-                <a:gridCol w="304800"/>
-                <a:gridCol w="1022985"/>
+                <a:gridCol w="1648460">
+                  <a:extLst>
+                    <a:ext uri="{9D8B030D-6E8A-4147-A177-3AD203B41FA5}">
+                      <a16:colId xmlns:a16="http://schemas.microsoft.com/office/drawing/2014/main" val="20000"/>
+                    </a:ext>
+                  </a:extLst>
+                </a:gridCol>
+                <a:gridCol w="304800">
+                  <a:extLst>
+                    <a:ext uri="{9D8B030D-6E8A-4147-A177-3AD203B41FA5}">
+                      <a16:colId xmlns:a16="http://schemas.microsoft.com/office/drawing/2014/main" val="20001"/>
+                    </a:ext>
+                  </a:extLst>
+                </a:gridCol>
+                <a:gridCol w="1022985">
+                  <a:extLst>
+                    <a:ext uri="{9D8B030D-6E8A-4147-A177-3AD203B41FA5}">
+                      <a16:colId xmlns:a16="http://schemas.microsoft.com/office/drawing/2014/main" val="20002"/>
+                    </a:ext>
+                  </a:extLst>
+                </a:gridCol>
               </a:tblGrid>
               <a:tr h="434528">
                 <a:tc>
@@ -6637,6 +6724,11 @@
                     </a:solidFill>
                   </a:tcPr>
                 </a:tc>
+                <a:extLst>
+                  <a:ext uri="{0D108BD9-81ED-4DB2-BD59-A6C34878D82A}">
+                    <a16:rowId xmlns:a16="http://schemas.microsoft.com/office/drawing/2014/main" val="10000"/>
+                  </a:ext>
+                </a:extLst>
               </a:tr>
               <a:tr h="533240">
                 <a:tc>
@@ -6754,6 +6846,11 @@
                     </a:solidFill>
                   </a:tcPr>
                 </a:tc>
+                <a:extLst>
+                  <a:ext uri="{0D108BD9-81ED-4DB2-BD59-A6C34878D82A}">
+                    <a16:rowId xmlns:a16="http://schemas.microsoft.com/office/drawing/2014/main" val="10001"/>
+                  </a:ext>
+                </a:extLst>
               </a:tr>
               <a:tr h="497289">
                 <a:tc>
@@ -6871,6 +6968,11 @@
                     </a:solidFill>
                   </a:tcPr>
                 </a:tc>
+                <a:extLst>
+                  <a:ext uri="{0D108BD9-81ED-4DB2-BD59-A6C34878D82A}">
+                    <a16:rowId xmlns:a16="http://schemas.microsoft.com/office/drawing/2014/main" val="10002"/>
+                  </a:ext>
+                </a:extLst>
               </a:tr>
             </a:tbl>
           </a:graphicData>
@@ -7352,7 +7454,9 @@
         <p:txBody>
           <a:bodyPr wrap="square" lIns="0" tIns="0" rIns="0" bIns="0" rtlCol="0"/>
           <a:lstStyle/>
-          <a:p/>
+          <a:p>
+            <a:endParaRPr/>
+          </a:p>
         </p:txBody>
       </p:sp>
       <p:sp>
@@ -7368,9 +7472,11 @@
         <p:spPr/>
         <p:txBody>
           <a:bodyPr/>
+          <a:lstStyle/>
           <a:p>
             <a:fld id="{B6F15528-21DE-4FAA-801E-634DDDAF4B2B}" type="slidenum">
               <a:rPr/>
+              <a:t>14</a:t>
             </a:fld>
             <a:endParaRPr/>
           </a:p>
@@ -7446,31 +7552,11 @@
         <p:txBody>
           <a:bodyPr wrap="square" lIns="0" tIns="0" rIns="0" bIns="0" rtlCol="0"/>
           <a:lstStyle/>
-          <a:p/>
+          <a:p>
+            <a:endParaRPr/>
+          </a:p>
         </p:txBody>
       </p:sp>
-      <p:pic>
-        <p:nvPicPr>
-          <p:cNvPr id="3" name="object 3"/>
-          <p:cNvPicPr/>
-          <p:nvPr/>
-        </p:nvPicPr>
-        <p:blipFill>
-          <a:blip r:embed="rId1" cstate="print"/>
-          <a:stretch>
-            <a:fillRect/>
-          </a:stretch>
-        </p:blipFill>
-        <p:spPr>
-          <a:xfrm>
-            <a:off x="11484864" y="6149340"/>
-            <a:ext cx="451103" cy="449580"/>
-          </a:xfrm>
-          <a:prstGeom prst="rect">
-            <a:avLst/>
-          </a:prstGeom>
-        </p:spPr>
-      </p:pic>
       <p:sp>
         <p:nvSpPr>
           <p:cNvPr id="4" name="object 4"/>
@@ -8061,7 +8147,9 @@
         <p:txBody>
           <a:bodyPr wrap="square" lIns="0" tIns="0" rIns="0" bIns="0" rtlCol="0"/>
           <a:lstStyle/>
-          <a:p/>
+          <a:p>
+            <a:endParaRPr/>
+          </a:p>
         </p:txBody>
       </p:sp>
       <p:sp>
@@ -8077,9 +8165,11 @@
         <p:spPr/>
         <p:txBody>
           <a:bodyPr/>
+          <a:lstStyle/>
           <a:p>
             <a:fld id="{B6F15528-21DE-4FAA-801E-634DDDAF4B2B}" type="slidenum">
               <a:rPr/>
+              <a:t>15</a:t>
             </a:fld>
             <a:endParaRPr/>
           </a:p>
@@ -8155,7 +8245,9 @@
         <p:txBody>
           <a:bodyPr wrap="square" lIns="0" tIns="0" rIns="0" bIns="0" rtlCol="0"/>
           <a:lstStyle/>
-          <a:p/>
+          <a:p>
+            <a:endParaRPr/>
+          </a:p>
         </p:txBody>
       </p:sp>
       <p:sp>
@@ -8798,7 +8890,7 @@
             <p:nvPr/>
           </p:nvPicPr>
           <p:blipFill>
-            <a:blip r:embed="rId1" cstate="print"/>
+            <a:blip r:embed="rId2" cstate="print"/>
             <a:stretch>
               <a:fillRect/>
             </a:stretch>
@@ -8820,7 +8912,7 @@
             <p:nvPr/>
           </p:nvPicPr>
           <p:blipFill>
-            <a:blip r:embed="rId2" cstate="print"/>
+            <a:blip r:embed="rId3" cstate="print"/>
             <a:stretch>
               <a:fillRect/>
             </a:stretch>
@@ -8842,7 +8934,7 @@
             <p:nvPr/>
           </p:nvPicPr>
           <p:blipFill>
-            <a:blip r:embed="rId3" cstate="print"/>
+            <a:blip r:embed="rId4" cstate="print"/>
             <a:stretch>
               <a:fillRect/>
             </a:stretch>
@@ -8865,7 +8957,7 @@
           <p:nvPr/>
         </p:nvPicPr>
         <p:blipFill>
-          <a:blip r:embed="rId4" cstate="print"/>
+          <a:blip r:embed="rId5" cstate="print"/>
           <a:stretch>
             <a:fillRect/>
           </a:stretch>
@@ -8887,7 +8979,7 @@
           <p:nvPr/>
         </p:nvPicPr>
         <p:blipFill>
-          <a:blip r:embed="rId5" cstate="print"/>
+          <a:blip r:embed="rId6" cstate="print"/>
           <a:stretch>
             <a:fillRect/>
           </a:stretch>
@@ -8909,7 +9001,7 @@
           <p:nvPr/>
         </p:nvPicPr>
         <p:blipFill>
-          <a:blip r:embed="rId6" cstate="print"/>
+          <a:blip r:embed="rId7" cstate="print"/>
           <a:stretch>
             <a:fillRect/>
           </a:stretch>
@@ -9121,7 +9213,9 @@
           <p:txBody>
             <a:bodyPr wrap="square" lIns="0" tIns="0" rIns="0" bIns="0" rtlCol="0"/>
             <a:lstStyle/>
-            <a:p/>
+            <a:p>
+              <a:endParaRPr/>
+            </a:p>
           </p:txBody>
         </p:sp>
         <p:sp>
@@ -9373,7 +9467,9 @@
           <p:txBody>
             <a:bodyPr wrap="square" lIns="0" tIns="0" rIns="0" bIns="0" rtlCol="0"/>
             <a:lstStyle/>
-            <a:p/>
+            <a:p>
+              <a:endParaRPr/>
+            </a:p>
           </p:txBody>
         </p:sp>
         <p:sp>
@@ -9423,7 +9519,9 @@
           <p:txBody>
             <a:bodyPr wrap="square" lIns="0" tIns="0" rIns="0" bIns="0" rtlCol="0"/>
             <a:lstStyle/>
-            <a:p/>
+            <a:p>
+              <a:endParaRPr/>
+            </a:p>
           </p:txBody>
         </p:sp>
         <p:sp>
@@ -9747,7 +9845,9 @@
           <p:txBody>
             <a:bodyPr wrap="square" lIns="0" tIns="0" rIns="0" bIns="0" rtlCol="0"/>
             <a:lstStyle/>
-            <a:p/>
+            <a:p>
+              <a:endParaRPr/>
+            </a:p>
           </p:txBody>
         </p:sp>
       </p:grpSp>
@@ -9764,9 +9864,11 @@
         <p:spPr/>
         <p:txBody>
           <a:bodyPr/>
+          <a:lstStyle/>
           <a:p>
             <a:fld id="{B6F15528-21DE-4FAA-801E-634DDDAF4B2B}" type="slidenum">
               <a:rPr/>
+              <a:t>16</a:t>
             </a:fld>
             <a:endParaRPr/>
           </a:p>
@@ -9804,7 +9906,7 @@
           <p:nvPr/>
         </p:nvPicPr>
         <p:blipFill>
-          <a:blip r:embed="rId1" cstate="print"/>
+          <a:blip r:embed="rId2" cstate="print"/>
           <a:stretch>
             <a:fillRect/>
           </a:stretch>
@@ -9826,7 +9928,7 @@
           <p:nvPr/>
         </p:nvPicPr>
         <p:blipFill>
-          <a:blip r:embed="rId2" cstate="print"/>
+          <a:blip r:embed="rId3" cstate="print"/>
           <a:stretch>
             <a:fillRect/>
           </a:stretch>
@@ -9918,7 +10020,7 @@
           <p:nvPr/>
         </p:nvPicPr>
         <p:blipFill>
-          <a:blip r:embed="rId3" cstate="print"/>
+          <a:blip r:embed="rId4" cstate="print"/>
           <a:stretch>
             <a:fillRect/>
           </a:stretch>
@@ -9940,7 +10042,7 @@
           <p:nvPr/>
         </p:nvPicPr>
         <p:blipFill>
-          <a:blip r:embed="rId4" cstate="print"/>
+          <a:blip r:embed="rId5" cstate="print"/>
           <a:stretch>
             <a:fillRect/>
           </a:stretch>
@@ -9976,7 +10078,7 @@
             <p:nvPr/>
           </p:nvPicPr>
           <p:blipFill>
-            <a:blip r:embed="rId5" cstate="print"/>
+            <a:blip r:embed="rId6" cstate="print"/>
             <a:stretch>
               <a:fillRect/>
             </a:stretch>
@@ -9998,7 +10100,7 @@
             <p:nvPr/>
           </p:nvPicPr>
           <p:blipFill>
-            <a:blip r:embed="rId6" cstate="print"/>
+            <a:blip r:embed="rId7" cstate="print"/>
             <a:stretch>
               <a:fillRect/>
             </a:stretch>
@@ -10020,7 +10122,7 @@
             <p:nvPr/>
           </p:nvPicPr>
           <p:blipFill>
-            <a:blip r:embed="rId7" cstate="print"/>
+            <a:blip r:embed="rId8" cstate="print"/>
             <a:stretch>
               <a:fillRect/>
             </a:stretch>
@@ -10113,7 +10215,7 @@
           <p:nvPr/>
         </p:nvPicPr>
         <p:blipFill>
-          <a:blip r:embed="rId8" cstate="print"/>
+          <a:blip r:embed="rId9" cstate="print"/>
           <a:stretch>
             <a:fillRect/>
           </a:stretch>
@@ -10135,7 +10237,7 @@
           <p:nvPr/>
         </p:nvPicPr>
         <p:blipFill>
-          <a:blip r:embed="rId9" cstate="print"/>
+          <a:blip r:embed="rId10" cstate="print"/>
           <a:stretch>
             <a:fillRect/>
           </a:stretch>
@@ -10157,7 +10259,7 @@
           <p:nvPr/>
         </p:nvPicPr>
         <p:blipFill>
-          <a:blip r:embed="rId10" cstate="print"/>
+          <a:blip r:embed="rId11" cstate="print"/>
           <a:stretch>
             <a:fillRect/>
           </a:stretch>
@@ -10249,7 +10351,7 @@
           <p:nvPr/>
         </p:nvPicPr>
         <p:blipFill>
-          <a:blip r:embed="rId11" cstate="print"/>
+          <a:blip r:embed="rId12" cstate="print"/>
           <a:stretch>
             <a:fillRect/>
           </a:stretch>
@@ -10285,7 +10387,7 @@
             <p:nvPr/>
           </p:nvPicPr>
           <p:blipFill>
-            <a:blip r:embed="rId12" cstate="print"/>
+            <a:blip r:embed="rId13" cstate="print"/>
             <a:stretch>
               <a:fillRect/>
             </a:stretch>
@@ -10307,7 +10409,7 @@
             <p:nvPr/>
           </p:nvPicPr>
           <p:blipFill>
-            <a:blip r:embed="rId13" cstate="print"/>
+            <a:blip r:embed="rId14" cstate="print"/>
             <a:stretch>
               <a:fillRect/>
             </a:stretch>
@@ -10330,7 +10432,7 @@
           <p:nvPr/>
         </p:nvPicPr>
         <p:blipFill>
-          <a:blip r:embed="rId14" cstate="print"/>
+          <a:blip r:embed="rId15" cstate="print"/>
           <a:stretch>
             <a:fillRect/>
           </a:stretch>
@@ -10358,9 +10460,11 @@
         <p:spPr/>
         <p:txBody>
           <a:bodyPr/>
+          <a:lstStyle/>
           <a:p>
             <a:fld id="{B6F15528-21DE-4FAA-801E-634DDDAF4B2B}" type="slidenum">
               <a:rPr/>
+              <a:t>17</a:t>
             </a:fld>
             <a:endParaRPr/>
           </a:p>
@@ -10398,7 +10502,7 @@
           <p:nvPr/>
         </p:nvPicPr>
         <p:blipFill>
-          <a:blip r:embed="rId1" cstate="print"/>
+          <a:blip r:embed="rId2" cstate="print"/>
           <a:stretch>
             <a:fillRect/>
           </a:stretch>
@@ -10420,7 +10524,7 @@
           <p:nvPr/>
         </p:nvPicPr>
         <p:blipFill>
-          <a:blip r:embed="rId2" cstate="print"/>
+          <a:blip r:embed="rId3" cstate="print"/>
           <a:stretch>
             <a:fillRect/>
           </a:stretch>
@@ -10536,7 +10640,7 @@
           <p:nvPr/>
         </p:nvPicPr>
         <p:blipFill>
-          <a:blip r:embed="rId3" cstate="print"/>
+          <a:blip r:embed="rId4" cstate="print"/>
           <a:stretch>
             <a:fillRect/>
           </a:stretch>
@@ -10558,7 +10662,7 @@
           <p:nvPr/>
         </p:nvPicPr>
         <p:blipFill>
-          <a:blip r:embed="rId4" cstate="print"/>
+          <a:blip r:embed="rId5" cstate="print"/>
           <a:stretch>
             <a:fillRect/>
           </a:stretch>
@@ -10594,7 +10698,7 @@
             <p:nvPr/>
           </p:nvPicPr>
           <p:blipFill>
-            <a:blip r:embed="rId5" cstate="print"/>
+            <a:blip r:embed="rId6" cstate="print"/>
             <a:stretch>
               <a:fillRect/>
             </a:stretch>
@@ -10616,7 +10720,7 @@
             <p:nvPr/>
           </p:nvPicPr>
           <p:blipFill>
-            <a:blip r:embed="rId6" cstate="print"/>
+            <a:blip r:embed="rId7" cstate="print"/>
             <a:stretch>
               <a:fillRect/>
             </a:stretch>
@@ -10638,7 +10742,7 @@
             <p:nvPr/>
           </p:nvPicPr>
           <p:blipFill>
-            <a:blip r:embed="rId7" cstate="print"/>
+            <a:blip r:embed="rId8" cstate="print"/>
             <a:stretch>
               <a:fillRect/>
             </a:stretch>
@@ -10675,7 +10779,7 @@
             <p:nvPr/>
           </p:nvPicPr>
           <p:blipFill>
-            <a:blip r:embed="rId8" cstate="print"/>
+            <a:blip r:embed="rId9" cstate="print"/>
             <a:stretch>
               <a:fillRect/>
             </a:stretch>
@@ -10697,7 +10801,7 @@
             <p:nvPr/>
           </p:nvPicPr>
           <p:blipFill>
-            <a:blip r:embed="rId9" cstate="print"/>
+            <a:blip r:embed="rId10" cstate="print"/>
             <a:stretch>
               <a:fillRect/>
             </a:stretch>
@@ -10719,7 +10823,7 @@
             <p:nvPr/>
           </p:nvPicPr>
           <p:blipFill>
-            <a:blip r:embed="rId10" cstate="print"/>
+            <a:blip r:embed="rId11" cstate="print"/>
             <a:stretch>
               <a:fillRect/>
             </a:stretch>
@@ -10812,7 +10916,7 @@
           <p:nvPr/>
         </p:nvPicPr>
         <p:blipFill>
-          <a:blip r:embed="rId11" cstate="print"/>
+          <a:blip r:embed="rId12" cstate="print"/>
           <a:stretch>
             <a:fillRect/>
           </a:stretch>
@@ -10848,7 +10952,7 @@
             <p:nvPr/>
           </p:nvPicPr>
           <p:blipFill>
-            <a:blip r:embed="rId12" cstate="print"/>
+            <a:blip r:embed="rId13" cstate="print"/>
             <a:stretch>
               <a:fillRect/>
             </a:stretch>
@@ -10870,7 +10974,7 @@
             <p:nvPr/>
           </p:nvPicPr>
           <p:blipFill>
-            <a:blip r:embed="rId13" cstate="print"/>
+            <a:blip r:embed="rId14" cstate="print"/>
             <a:stretch>
               <a:fillRect/>
             </a:stretch>
@@ -10893,7 +10997,7 @@
           <p:nvPr/>
         </p:nvPicPr>
         <p:blipFill>
-          <a:blip r:embed="rId14" cstate="print"/>
+          <a:blip r:embed="rId15" cstate="print"/>
           <a:stretch>
             <a:fillRect/>
           </a:stretch>
@@ -10921,9 +11025,11 @@
         <p:spPr/>
         <p:txBody>
           <a:bodyPr/>
+          <a:lstStyle/>
           <a:p>
             <a:fld id="{B6F15528-21DE-4FAA-801E-634DDDAF4B2B}" type="slidenum">
               <a:rPr/>
+              <a:t>18</a:t>
             </a:fld>
             <a:endParaRPr/>
           </a:p>
@@ -10961,7 +11067,7 @@
           <p:nvPr/>
         </p:nvPicPr>
         <p:blipFill>
-          <a:blip r:embed="rId1" cstate="print"/>
+          <a:blip r:embed="rId2" cstate="print"/>
           <a:stretch>
             <a:fillRect/>
           </a:stretch>
@@ -10983,7 +11089,7 @@
           <p:nvPr/>
         </p:nvPicPr>
         <p:blipFill>
-          <a:blip r:embed="rId2" cstate="print"/>
+          <a:blip r:embed="rId3" cstate="print"/>
           <a:stretch>
             <a:fillRect/>
           </a:stretch>
@@ -11019,7 +11125,7 @@
             <p:nvPr/>
           </p:nvPicPr>
           <p:blipFill>
-            <a:blip r:embed="rId3" cstate="print"/>
+            <a:blip r:embed="rId4" cstate="print"/>
             <a:stretch>
               <a:fillRect/>
             </a:stretch>
@@ -11041,7 +11147,7 @@
             <p:nvPr/>
           </p:nvPicPr>
           <p:blipFill>
-            <a:blip r:embed="rId4" cstate="print"/>
+            <a:blip r:embed="rId5" cstate="print"/>
             <a:stretch>
               <a:fillRect/>
             </a:stretch>
@@ -11063,7 +11169,7 @@
             <p:nvPr/>
           </p:nvPicPr>
           <p:blipFill>
-            <a:blip r:embed="rId5" cstate="print"/>
+            <a:blip r:embed="rId6" cstate="print"/>
             <a:stretch>
               <a:fillRect/>
             </a:stretch>
@@ -11086,7 +11192,7 @@
           <p:nvPr/>
         </p:nvPicPr>
         <p:blipFill>
-          <a:blip r:embed="rId6" cstate="print"/>
+          <a:blip r:embed="rId7" cstate="print"/>
           <a:stretch>
             <a:fillRect/>
           </a:stretch>
@@ -11108,7 +11214,7 @@
           <p:nvPr/>
         </p:nvPicPr>
         <p:blipFill>
-          <a:blip r:embed="rId7" cstate="print"/>
+          <a:blip r:embed="rId8" cstate="print"/>
           <a:stretch>
             <a:fillRect/>
           </a:stretch>
@@ -11144,7 +11250,7 @@
             <p:nvPr/>
           </p:nvPicPr>
           <p:blipFill>
-            <a:blip r:embed="rId8" cstate="print"/>
+            <a:blip r:embed="rId9" cstate="print"/>
             <a:stretch>
               <a:fillRect/>
             </a:stretch>
@@ -11166,7 +11272,7 @@
             <p:nvPr/>
           </p:nvPicPr>
           <p:blipFill>
-            <a:blip r:embed="rId9" cstate="print"/>
+            <a:blip r:embed="rId10" cstate="print"/>
             <a:stretch>
               <a:fillRect/>
             </a:stretch>
@@ -11188,7 +11294,7 @@
             <p:nvPr/>
           </p:nvPicPr>
           <p:blipFill>
-            <a:blip r:embed="rId10" cstate="print"/>
+            <a:blip r:embed="rId11" cstate="print"/>
             <a:stretch>
               <a:fillRect/>
             </a:stretch>
@@ -11211,7 +11317,7 @@
           <p:nvPr/>
         </p:nvPicPr>
         <p:blipFill>
-          <a:blip r:embed="rId11" cstate="print"/>
+          <a:blip r:embed="rId12" cstate="print"/>
           <a:stretch>
             <a:fillRect/>
           </a:stretch>
@@ -11239,9 +11345,11 @@
         <p:spPr/>
         <p:txBody>
           <a:bodyPr/>
+          <a:lstStyle/>
           <a:p>
             <a:fld id="{B6F15528-21DE-4FAA-801E-634DDDAF4B2B}" type="slidenum">
               <a:rPr/>
+              <a:t>2</a:t>
             </a:fld>
             <a:endParaRPr/>
           </a:p>
@@ -11279,7 +11387,7 @@
           <p:nvPr/>
         </p:nvPicPr>
         <p:blipFill>
-          <a:blip r:embed="rId1" cstate="print"/>
+          <a:blip r:embed="rId2" cstate="print"/>
           <a:stretch>
             <a:fillRect/>
           </a:stretch>
@@ -11301,7 +11409,7 @@
           <p:nvPr/>
         </p:nvPicPr>
         <p:blipFill>
-          <a:blip r:embed="rId2" cstate="print"/>
+          <a:blip r:embed="rId3" cstate="print"/>
           <a:stretch>
             <a:fillRect/>
           </a:stretch>
@@ -11323,7 +11431,7 @@
           <p:nvPr/>
         </p:nvPicPr>
         <p:blipFill>
-          <a:blip r:embed="rId3" cstate="print"/>
+          <a:blip r:embed="rId4" cstate="print"/>
           <a:stretch>
             <a:fillRect/>
           </a:stretch>
@@ -11359,7 +11467,7 @@
             <p:nvPr/>
           </p:nvPicPr>
           <p:blipFill>
-            <a:blip r:embed="rId4" cstate="print"/>
+            <a:blip r:embed="rId5" cstate="print"/>
             <a:stretch>
               <a:fillRect/>
             </a:stretch>
@@ -11381,7 +11489,7 @@
             <p:nvPr/>
           </p:nvPicPr>
           <p:blipFill>
-            <a:blip r:embed="rId5" cstate="print"/>
+            <a:blip r:embed="rId6" cstate="print"/>
             <a:stretch>
               <a:fillRect/>
             </a:stretch>
@@ -11403,7 +11511,7 @@
             <p:nvPr/>
           </p:nvPicPr>
           <p:blipFill>
-            <a:blip r:embed="rId6" cstate="print"/>
+            <a:blip r:embed="rId7" cstate="print"/>
             <a:stretch>
               <a:fillRect/>
             </a:stretch>
@@ -11440,7 +11548,7 @@
             <p:nvPr/>
           </p:nvPicPr>
           <p:blipFill>
-            <a:blip r:embed="rId7" cstate="print"/>
+            <a:blip r:embed="rId8" cstate="print"/>
             <a:stretch>
               <a:fillRect/>
             </a:stretch>
@@ -11462,7 +11570,7 @@
             <p:nvPr/>
           </p:nvPicPr>
           <p:blipFill>
-            <a:blip r:embed="rId8" cstate="print"/>
+            <a:blip r:embed="rId9" cstate="print"/>
             <a:stretch>
               <a:fillRect/>
             </a:stretch>
@@ -11485,7 +11593,7 @@
           <p:nvPr/>
         </p:nvPicPr>
         <p:blipFill>
-          <a:blip r:embed="rId9" cstate="print"/>
+          <a:blip r:embed="rId10" cstate="print"/>
           <a:stretch>
             <a:fillRect/>
           </a:stretch>
@@ -11521,7 +11629,7 @@
             <p:nvPr/>
           </p:nvPicPr>
           <p:blipFill>
-            <a:blip r:embed="rId10" cstate="print"/>
+            <a:blip r:embed="rId11" cstate="print"/>
             <a:stretch>
               <a:fillRect/>
             </a:stretch>
@@ -11543,7 +11651,7 @@
             <p:nvPr/>
           </p:nvPicPr>
           <p:blipFill>
-            <a:blip r:embed="rId11" cstate="print"/>
+            <a:blip r:embed="rId12" cstate="print"/>
             <a:stretch>
               <a:fillRect/>
             </a:stretch>
@@ -11565,7 +11673,7 @@
             <p:nvPr/>
           </p:nvPicPr>
           <p:blipFill>
-            <a:blip r:embed="rId12" cstate="print"/>
+            <a:blip r:embed="rId13" cstate="print"/>
             <a:stretch>
               <a:fillRect/>
             </a:stretch>
@@ -11587,7 +11695,7 @@
             <p:nvPr/>
           </p:nvPicPr>
           <p:blipFill>
-            <a:blip r:embed="rId13" cstate="print"/>
+            <a:blip r:embed="rId14" cstate="print"/>
             <a:stretch>
               <a:fillRect/>
             </a:stretch>
@@ -11610,7 +11718,7 @@
           <p:nvPr/>
         </p:nvPicPr>
         <p:blipFill>
-          <a:blip r:embed="rId14" cstate="print"/>
+          <a:blip r:embed="rId15" cstate="print"/>
           <a:stretch>
             <a:fillRect/>
           </a:stretch>
@@ -11632,7 +11740,7 @@
           <p:nvPr/>
         </p:nvPicPr>
         <p:blipFill>
-          <a:blip r:embed="rId15" cstate="print"/>
+          <a:blip r:embed="rId16" cstate="print"/>
           <a:stretch>
             <a:fillRect/>
           </a:stretch>
@@ -11654,7 +11762,7 @@
           <p:nvPr/>
         </p:nvPicPr>
         <p:blipFill>
-          <a:blip r:embed="rId16" cstate="print"/>
+          <a:blip r:embed="rId17" cstate="print"/>
           <a:stretch>
             <a:fillRect/>
           </a:stretch>
@@ -11676,7 +11784,7 @@
           <p:nvPr/>
         </p:nvPicPr>
         <p:blipFill>
-          <a:blip r:embed="rId17" cstate="print"/>
+          <a:blip r:embed="rId18" cstate="print"/>
           <a:stretch>
             <a:fillRect/>
           </a:stretch>
@@ -11704,9 +11812,11 @@
         <p:spPr/>
         <p:txBody>
           <a:bodyPr/>
+          <a:lstStyle/>
           <a:p>
             <a:fld id="{B6F15528-21DE-4FAA-801E-634DDDAF4B2B}" type="slidenum">
               <a:rPr/>
+              <a:t>3</a:t>
             </a:fld>
             <a:endParaRPr/>
           </a:p>
@@ -11744,7 +11854,7 @@
           <p:nvPr/>
         </p:nvPicPr>
         <p:blipFill>
-          <a:blip r:embed="rId1" cstate="print"/>
+          <a:blip r:embed="rId2" cstate="print"/>
           <a:stretch>
             <a:fillRect/>
           </a:stretch>
@@ -11780,7 +11890,7 @@
             <p:nvPr/>
           </p:nvPicPr>
           <p:blipFill>
-            <a:blip r:embed="rId2" cstate="print"/>
+            <a:blip r:embed="rId3" cstate="print"/>
             <a:stretch>
               <a:fillRect/>
             </a:stretch>
@@ -11802,7 +11912,7 @@
             <p:nvPr/>
           </p:nvPicPr>
           <p:blipFill>
-            <a:blip r:embed="rId3" cstate="print"/>
+            <a:blip r:embed="rId4" cstate="print"/>
             <a:stretch>
               <a:fillRect/>
             </a:stretch>
@@ -11825,7 +11935,7 @@
           <p:nvPr/>
         </p:nvPicPr>
         <p:blipFill>
-          <a:blip r:embed="rId4" cstate="print"/>
+          <a:blip r:embed="rId5" cstate="print"/>
           <a:stretch>
             <a:fillRect/>
           </a:stretch>
@@ -11847,7 +11957,7 @@
           <p:nvPr/>
         </p:nvPicPr>
         <p:blipFill>
-          <a:blip r:embed="rId5" cstate="print"/>
+          <a:blip r:embed="rId6" cstate="print"/>
           <a:stretch>
             <a:fillRect/>
           </a:stretch>
@@ -11869,7 +11979,7 @@
           <p:nvPr/>
         </p:nvPicPr>
         <p:blipFill>
-          <a:blip r:embed="rId6" cstate="print"/>
+          <a:blip r:embed="rId7" cstate="print"/>
           <a:stretch>
             <a:fillRect/>
           </a:stretch>
@@ -12005,11 +12115,6 @@
               </a:rPr>
               <a:t>;</a:t>
             </a:r>
-            <a:endParaRPr dirty="0">
-              <a:solidFill>
-                <a:srgbClr val="675BA7"/>
-              </a:solidFill>
-            </a:endParaRPr>
           </a:p>
         </p:txBody>
       </p:sp>
@@ -12026,9 +12131,11 @@
         <p:spPr/>
         <p:txBody>
           <a:bodyPr/>
+          <a:lstStyle/>
           <a:p>
             <a:fld id="{B6F15528-21DE-4FAA-801E-634DDDAF4B2B}" type="slidenum">
               <a:rPr/>
+              <a:t>4</a:t>
             </a:fld>
             <a:endParaRPr/>
           </a:p>
@@ -12072,6 +12179,7 @@
         <p:spPr/>
         <p:txBody>
           <a:bodyPr/>
+          <a:lstStyle/>
           <a:p>
             <a:endParaRPr lang="en-US"/>
           </a:p>
@@ -12122,7 +12230,9 @@
         <p:txBody>
           <a:bodyPr wrap="square" lIns="0" tIns="0" rIns="0" bIns="0" rtlCol="0"/>
           <a:lstStyle/>
-          <a:p/>
+          <a:p>
+            <a:endParaRPr/>
+          </a:p>
         </p:txBody>
       </p:sp>
       <p:sp>
@@ -12143,6 +12253,7 @@
         </p:spPr>
         <p:txBody>
           <a:bodyPr/>
+          <a:lstStyle/>
           <a:p>
             <a:r>
               <a:rPr lang="en-US" b="1">
@@ -12152,36 +12263,9 @@
               </a:rPr>
               <a:t>Entry</a:t>
             </a:r>
-            <a:endParaRPr lang="en-US" b="1">
-              <a:solidFill>
-                <a:srgbClr val="FF0000"/>
-              </a:solidFill>
-            </a:endParaRPr>
           </a:p>
         </p:txBody>
       </p:sp>
-      <p:pic>
-        <p:nvPicPr>
-          <p:cNvPr id="3" name="object 3"/>
-          <p:cNvPicPr/>
-          <p:nvPr/>
-        </p:nvPicPr>
-        <p:blipFill>
-          <a:blip r:embed="rId1" cstate="print"/>
-          <a:stretch>
-            <a:fillRect/>
-          </a:stretch>
-        </p:blipFill>
-        <p:spPr>
-          <a:xfrm>
-            <a:off x="11484864" y="6149340"/>
-            <a:ext cx="451103" cy="449580"/>
-          </a:xfrm>
-          <a:prstGeom prst="rect">
-            <a:avLst/>
-          </a:prstGeom>
-        </p:spPr>
-      </p:pic>
       <p:sp>
         <p:nvSpPr>
           <p:cNvPr id="4" name="object 4"/>
@@ -12281,7 +12365,7 @@
               </a:rPr>
               <a:t>4;</a:t>
             </a:r>
-            <a:endParaRPr sz="2000">
+            <a:endParaRPr sz="2000" dirty="0">
               <a:latin typeface="Courier New" panose="02070309020205020404"/>
               <a:cs typeface="Courier New" panose="02070309020205020404"/>
             </a:endParaRPr>
@@ -12422,7 +12506,7 @@
               </a:rPr>
               <a:t>{</a:t>
             </a:r>
-            <a:endParaRPr sz="2000">
+            <a:endParaRPr sz="2000" dirty="0">
               <a:latin typeface="Courier New" panose="02070309020205020404"/>
               <a:cs typeface="Courier New" panose="02070309020205020404"/>
             </a:endParaRPr>
@@ -12983,54 +13067,6 @@
               <a:cs typeface="Courier New" panose="02070309020205020404"/>
             </a:endParaRPr>
           </a:p>
-        </p:txBody>
-      </p:sp>
-      <p:sp>
-        <p:nvSpPr>
-          <p:cNvPr id="14" name="object 14"/>
-          <p:cNvSpPr/>
-          <p:nvPr/>
-        </p:nvSpPr>
-        <p:spPr>
-          <a:xfrm>
-            <a:off x="3476244" y="3144011"/>
-            <a:ext cx="372110" cy="445134"/>
-          </a:xfrm>
-          <a:custGeom>
-            <a:avLst/>
-            <a:gdLst/>
-            <a:ahLst/>
-            <a:cxnLst/>
-            <a:rect l="l" t="t" r="r" b="b"/>
-            <a:pathLst>
-              <a:path w="372110" h="445135">
-                <a:moveTo>
-                  <a:pt x="371855" y="0"/>
-                </a:moveTo>
-                <a:lnTo>
-                  <a:pt x="0" y="0"/>
-                </a:lnTo>
-                <a:lnTo>
-                  <a:pt x="0" y="445008"/>
-                </a:lnTo>
-                <a:lnTo>
-                  <a:pt x="371855" y="445008"/>
-                </a:lnTo>
-                <a:lnTo>
-                  <a:pt x="371855" y="0"/>
-                </a:lnTo>
-                <a:close/>
-              </a:path>
-            </a:pathLst>
-          </a:custGeom>
-          <a:solidFill>
-            <a:srgbClr val="171717"/>
-          </a:solidFill>
-        </p:spPr>
-        <p:txBody>
-          <a:bodyPr wrap="square" lIns="0" tIns="0" rIns="0" bIns="0" rtlCol="0"/>
-          <a:lstStyle/>
-          <a:p/>
         </p:txBody>
       </p:sp>
       <p:sp>
@@ -13080,7 +13116,9 @@
         <p:txBody>
           <a:bodyPr wrap="square" lIns="0" tIns="0" rIns="0" bIns="0" rtlCol="0"/>
           <a:lstStyle/>
-          <a:p/>
+          <a:p>
+            <a:endParaRPr/>
+          </a:p>
         </p:txBody>
       </p:sp>
       <p:sp>
@@ -13128,7 +13166,9 @@
         <p:txBody>
           <a:bodyPr wrap="square" lIns="0" tIns="0" rIns="0" bIns="0" rtlCol="0"/>
           <a:lstStyle/>
-          <a:p/>
+          <a:p>
+            <a:endParaRPr/>
+          </a:p>
         </p:txBody>
       </p:sp>
       <p:sp>
@@ -13144,9 +13184,11 @@
         <p:spPr/>
         <p:txBody>
           <a:bodyPr/>
+          <a:lstStyle/>
           <a:p>
             <a:fld id="{B6F15528-21DE-4FAA-801E-634DDDAF4B2B}" type="slidenum">
               <a:rPr/>
+              <a:t>5</a:t>
             </a:fld>
             <a:endParaRPr/>
           </a:p>
@@ -13156,7 +13198,7 @@
         <p:nvPicPr>
           <p:cNvPr id="18" name="Content Placeholder 17"/>
           <p:cNvPicPr>
-            <a:picLocks noChangeAspect="1"/>
+            <a:picLocks noGrp="1" noChangeAspect="1"/>
           </p:cNvPicPr>
           <p:nvPr>
             <p:ph sz="half" idx="2"/>
@@ -13273,11 +13315,6 @@
               </a:rPr>
               <a:t>Exit</a:t>
             </a:r>
-            <a:endParaRPr lang="en-US" b="1">
-              <a:solidFill>
-                <a:srgbClr val="FF0000"/>
-              </a:solidFill>
-            </a:endParaRPr>
           </a:p>
         </p:txBody>
       </p:sp>
@@ -13327,7 +13364,7 @@
             <p:nvPr/>
           </p:nvPicPr>
           <p:blipFill>
-            <a:blip r:embed="rId1" cstate="print"/>
+            <a:blip r:embed="rId2" cstate="print"/>
             <a:stretch>
               <a:fillRect/>
             </a:stretch>
@@ -13349,7 +13386,7 @@
             <p:nvPr/>
           </p:nvPicPr>
           <p:blipFill>
-            <a:blip r:embed="rId2" cstate="print"/>
+            <a:blip r:embed="rId3" cstate="print"/>
             <a:stretch>
               <a:fillRect/>
             </a:stretch>
@@ -13371,7 +13408,7 @@
             <p:nvPr/>
           </p:nvPicPr>
           <p:blipFill>
-            <a:blip r:embed="rId3" cstate="print"/>
+            <a:blip r:embed="rId4" cstate="print"/>
             <a:stretch>
               <a:fillRect/>
             </a:stretch>
@@ -13408,7 +13445,7 @@
             <p:nvPr/>
           </p:nvPicPr>
           <p:blipFill>
-            <a:blip r:embed="rId4" cstate="print"/>
+            <a:blip r:embed="rId5" cstate="print"/>
             <a:stretch>
               <a:fillRect/>
             </a:stretch>
@@ -13430,7 +13467,7 @@
             <p:nvPr/>
           </p:nvPicPr>
           <p:blipFill>
-            <a:blip r:embed="rId5" cstate="print"/>
+            <a:blip r:embed="rId6" cstate="print"/>
             <a:stretch>
               <a:fillRect/>
             </a:stretch>
@@ -13467,7 +13504,7 @@
             <p:nvPr/>
           </p:nvPicPr>
           <p:blipFill>
-            <a:blip r:embed="rId6" cstate="print"/>
+            <a:blip r:embed="rId7" cstate="print"/>
             <a:stretch>
               <a:fillRect/>
             </a:stretch>
@@ -13489,7 +13526,7 @@
             <p:nvPr/>
           </p:nvPicPr>
           <p:blipFill>
-            <a:blip r:embed="rId7" cstate="print"/>
+            <a:blip r:embed="rId8" cstate="print"/>
             <a:stretch>
               <a:fillRect/>
             </a:stretch>
@@ -13512,7 +13549,7 @@
           <p:nvPr/>
         </p:nvPicPr>
         <p:blipFill>
-          <a:blip r:embed="rId8" cstate="print"/>
+          <a:blip r:embed="rId9" cstate="print"/>
           <a:stretch>
             <a:fillRect/>
           </a:stretch>
@@ -13708,7 +13745,7 @@
           <p:nvPr/>
         </p:nvPicPr>
         <p:blipFill>
-          <a:blip r:embed="rId9" cstate="print"/>
+          <a:blip r:embed="rId10" cstate="print"/>
           <a:stretch>
             <a:fillRect/>
           </a:stretch>
@@ -13736,9 +13773,11 @@
         <p:spPr/>
         <p:txBody>
           <a:bodyPr/>
+          <a:lstStyle/>
           <a:p>
             <a:fld id="{B6F15528-21DE-4FAA-801E-634DDDAF4B2B}" type="slidenum">
               <a:rPr/>
+              <a:t>6</a:t>
             </a:fld>
             <a:endParaRPr/>
           </a:p>
@@ -13814,7 +13853,9 @@
         <p:txBody>
           <a:bodyPr wrap="square" lIns="0" tIns="0" rIns="0" bIns="0" rtlCol="0"/>
           <a:lstStyle/>
-          <a:p/>
+          <a:p>
+            <a:endParaRPr/>
+          </a:p>
         </p:txBody>
       </p:sp>
       <p:grpSp>
@@ -13838,7 +13879,7 @@
             <p:nvPr/>
           </p:nvPicPr>
           <p:blipFill>
-            <a:blip r:embed="rId1" cstate="print"/>
+            <a:blip r:embed="rId2" cstate="print"/>
             <a:stretch>
               <a:fillRect/>
             </a:stretch>
@@ -13898,7 +13939,9 @@
           <p:txBody>
             <a:bodyPr wrap="square" lIns="0" tIns="0" rIns="0" bIns="0" rtlCol="0"/>
             <a:lstStyle/>
-            <a:p/>
+            <a:p>
+              <a:endParaRPr/>
+            </a:p>
           </p:txBody>
         </p:sp>
         <p:sp>
@@ -13958,7 +14001,9 @@
           <p:txBody>
             <a:bodyPr wrap="square" lIns="0" tIns="0" rIns="0" bIns="0" rtlCol="0"/>
             <a:lstStyle/>
-            <a:p/>
+            <a:p>
+              <a:endParaRPr/>
+            </a:p>
           </p:txBody>
         </p:sp>
       </p:grpSp>
@@ -14829,7 +14874,7 @@
             <p:nvPr/>
           </p:nvPicPr>
           <p:blipFill>
-            <a:blip r:embed="rId2" cstate="print"/>
+            <a:blip r:embed="rId3" cstate="print"/>
             <a:stretch>
               <a:fillRect/>
             </a:stretch>
@@ -14851,7 +14896,7 @@
             <p:nvPr/>
           </p:nvPicPr>
           <p:blipFill>
-            <a:blip r:embed="rId3" cstate="print"/>
+            <a:blip r:embed="rId4" cstate="print"/>
             <a:stretch>
               <a:fillRect/>
             </a:stretch>
@@ -14873,7 +14918,7 @@
             <p:nvPr/>
           </p:nvPicPr>
           <p:blipFill>
-            <a:blip r:embed="rId4" cstate="print"/>
+            <a:blip r:embed="rId5" cstate="print"/>
             <a:stretch>
               <a:fillRect/>
             </a:stretch>
@@ -14934,7 +14979,9 @@
         <p:txBody>
           <a:bodyPr wrap="square" lIns="0" tIns="0" rIns="0" bIns="0" rtlCol="0"/>
           <a:lstStyle/>
-          <a:p/>
+          <a:p>
+            <a:endParaRPr/>
+          </a:p>
         </p:txBody>
       </p:sp>
       <p:sp>
@@ -14982,7 +15029,9 @@
         <p:txBody>
           <a:bodyPr wrap="square" lIns="0" tIns="0" rIns="0" bIns="0" rtlCol="0"/>
           <a:lstStyle/>
-          <a:p/>
+          <a:p>
+            <a:endParaRPr/>
+          </a:p>
         </p:txBody>
       </p:sp>
       <p:sp>
@@ -15030,7 +15079,9 @@
         <p:txBody>
           <a:bodyPr wrap="square" lIns="0" tIns="0" rIns="0" bIns="0" rtlCol="0"/>
           <a:lstStyle/>
-          <a:p/>
+          <a:p>
+            <a:endParaRPr/>
+          </a:p>
         </p:txBody>
       </p:sp>
       <p:sp>
@@ -15078,7 +15129,9 @@
         <p:txBody>
           <a:bodyPr wrap="square" lIns="0" tIns="0" rIns="0" bIns="0" rtlCol="0"/>
           <a:lstStyle/>
-          <a:p/>
+          <a:p>
+            <a:endParaRPr/>
+          </a:p>
         </p:txBody>
       </p:sp>
       <p:sp>
@@ -15126,7 +15179,9 @@
         <p:txBody>
           <a:bodyPr wrap="square" lIns="0" tIns="0" rIns="0" bIns="0" rtlCol="0"/>
           <a:lstStyle/>
-          <a:p/>
+          <a:p>
+            <a:endParaRPr/>
+          </a:p>
         </p:txBody>
       </p:sp>
       <p:sp>
@@ -15174,7 +15229,9 @@
         <p:txBody>
           <a:bodyPr wrap="square" lIns="0" tIns="0" rIns="0" bIns="0" rtlCol="0"/>
           <a:lstStyle/>
-          <a:p/>
+          <a:p>
+            <a:endParaRPr/>
+          </a:p>
         </p:txBody>
       </p:sp>
       <p:sp>
@@ -15222,7 +15279,9 @@
         <p:txBody>
           <a:bodyPr wrap="square" lIns="0" tIns="0" rIns="0" bIns="0" rtlCol="0"/>
           <a:lstStyle/>
-          <a:p/>
+          <a:p>
+            <a:endParaRPr/>
+          </a:p>
         </p:txBody>
       </p:sp>
       <p:sp>
@@ -15270,7 +15329,9 @@
         <p:txBody>
           <a:bodyPr wrap="square" lIns="0" tIns="0" rIns="0" bIns="0" rtlCol="0"/>
           <a:lstStyle/>
-          <a:p/>
+          <a:p>
+            <a:endParaRPr/>
+          </a:p>
         </p:txBody>
       </p:sp>
       <p:grpSp>
@@ -15294,7 +15355,7 @@
             <p:nvPr/>
           </p:nvPicPr>
           <p:blipFill>
-            <a:blip r:embed="rId5" cstate="print"/>
+            <a:blip r:embed="rId6" cstate="print"/>
             <a:stretch>
               <a:fillRect/>
             </a:stretch>
@@ -15356,7 +15417,9 @@
           <p:txBody>
             <a:bodyPr wrap="square" lIns="0" tIns="0" rIns="0" bIns="0" rtlCol="0"/>
             <a:lstStyle/>
-            <a:p/>
+            <a:p>
+              <a:endParaRPr/>
+            </a:p>
           </p:txBody>
         </p:sp>
         <p:sp>
@@ -15413,7 +15476,9 @@
           <p:txBody>
             <a:bodyPr wrap="square" lIns="0" tIns="0" rIns="0" bIns="0" rtlCol="0"/>
             <a:lstStyle/>
-            <a:p/>
+            <a:p>
+              <a:endParaRPr/>
+            </a:p>
           </p:txBody>
         </p:sp>
       </p:grpSp>
@@ -15430,9 +15495,11 @@
         <p:spPr/>
         <p:txBody>
           <a:bodyPr/>
+          <a:lstStyle/>
           <a:p>
             <a:fld id="{B6F15528-21DE-4FAA-801E-634DDDAF4B2B}" type="slidenum">
               <a:rPr/>
+              <a:t>7</a:t>
             </a:fld>
             <a:endParaRPr/>
           </a:p>
@@ -15458,12 +15525,12 @@
           <a:bodyPr wrap="square" rtlCol="0">
             <a:spAutoFit/>
           </a:bodyPr>
+          <a:lstStyle/>
           <a:p>
             <a:r>
               <a:rPr lang="en-US"/>
               <a:t>40</a:t>
             </a:r>
-            <a:endParaRPr lang="en-US"/>
           </a:p>
         </p:txBody>
       </p:sp>
@@ -15537,7 +15604,9 @@
         <p:txBody>
           <a:bodyPr wrap="square" lIns="0" tIns="0" rIns="0" bIns="0" rtlCol="0"/>
           <a:lstStyle/>
-          <a:p/>
+          <a:p>
+            <a:endParaRPr/>
+          </a:p>
         </p:txBody>
       </p:sp>
       <p:grpSp>
@@ -15561,7 +15630,7 @@
             <p:nvPr/>
           </p:nvPicPr>
           <p:blipFill>
-            <a:blip r:embed="rId1" cstate="print"/>
+            <a:blip r:embed="rId2" cstate="print"/>
             <a:stretch>
               <a:fillRect/>
             </a:stretch>
@@ -15621,7 +15690,9 @@
           <p:txBody>
             <a:bodyPr wrap="square" lIns="0" tIns="0" rIns="0" bIns="0" rtlCol="0"/>
             <a:lstStyle/>
-            <a:p/>
+            <a:p>
+              <a:endParaRPr/>
+            </a:p>
           </p:txBody>
         </p:sp>
         <p:sp>
@@ -15681,7 +15752,9 @@
           <p:txBody>
             <a:bodyPr wrap="square" lIns="0" tIns="0" rIns="0" bIns="0" rtlCol="0"/>
             <a:lstStyle/>
-            <a:p/>
+            <a:p>
+              <a:endParaRPr/>
+            </a:p>
           </p:txBody>
         </p:sp>
       </p:grpSp>
@@ -16038,7 +16111,7 @@
               </a:rPr>
               <a:t>);</a:t>
             </a:r>
-            <a:endParaRPr sz="2000">
+            <a:endParaRPr sz="2000" dirty="0">
               <a:latin typeface="Courier New" panose="02070309020205020404"/>
               <a:cs typeface="Courier New" panose="02070309020205020404"/>
             </a:endParaRPr>
@@ -16102,7 +16175,7 @@
               </a:rPr>
               <a:t>“);</a:t>
             </a:r>
-            <a:endParaRPr sz="2000">
+            <a:endParaRPr sz="2000" dirty="0">
               <a:latin typeface="Courier New" panose="02070309020205020404"/>
               <a:cs typeface="Courier New" panose="02070309020205020404"/>
             </a:endParaRPr>
@@ -16166,7 +16239,7 @@
               </a:rPr>
               <a:t>2;</a:t>
             </a:r>
-            <a:endParaRPr sz="2000">
+            <a:endParaRPr sz="2000" dirty="0">
               <a:latin typeface="Courier New" panose="02070309020205020404"/>
               <a:cs typeface="Courier New" panose="02070309020205020404"/>
             </a:endParaRPr>
@@ -16210,7 +16283,7 @@
               </a:rPr>
               <a:t>);</a:t>
             </a:r>
-            <a:endParaRPr sz="2000">
+            <a:endParaRPr sz="2000" dirty="0">
               <a:latin typeface="Courier New" panose="02070309020205020404"/>
               <a:cs typeface="Courier New" panose="02070309020205020404"/>
             </a:endParaRPr>
@@ -16354,7 +16427,7 @@
             <p:nvPr/>
           </p:nvPicPr>
           <p:blipFill>
-            <a:blip r:embed="rId2" cstate="print"/>
+            <a:blip r:embed="rId3" cstate="print"/>
             <a:stretch>
               <a:fillRect/>
             </a:stretch>
@@ -16376,7 +16449,7 @@
             <p:nvPr/>
           </p:nvPicPr>
           <p:blipFill>
-            <a:blip r:embed="rId3" cstate="print"/>
+            <a:blip r:embed="rId4" cstate="print"/>
             <a:stretch>
               <a:fillRect/>
             </a:stretch>
@@ -16398,7 +16471,7 @@
             <p:nvPr/>
           </p:nvPicPr>
           <p:blipFill>
-            <a:blip r:embed="rId4" cstate="print"/>
+            <a:blip r:embed="rId5" cstate="print"/>
             <a:stretch>
               <a:fillRect/>
             </a:stretch>
@@ -16477,7 +16550,9 @@
         <p:txBody>
           <a:bodyPr wrap="square" lIns="0" tIns="0" rIns="0" bIns="0" rtlCol="0"/>
           <a:lstStyle/>
-          <a:p/>
+          <a:p>
+            <a:endParaRPr/>
+          </a:p>
         </p:txBody>
       </p:sp>
       <p:grpSp>
@@ -16501,7 +16576,7 @@
             <p:nvPr/>
           </p:nvPicPr>
           <p:blipFill>
-            <a:blip r:embed="rId5" cstate="print"/>
+            <a:blip r:embed="rId6" cstate="print"/>
             <a:stretch>
               <a:fillRect/>
             </a:stretch>
@@ -16563,7 +16638,9 @@
           <p:txBody>
             <a:bodyPr wrap="square" lIns="0" tIns="0" rIns="0" bIns="0" rtlCol="0"/>
             <a:lstStyle/>
-            <a:p/>
+            <a:p>
+              <a:endParaRPr/>
+            </a:p>
           </p:txBody>
         </p:sp>
         <p:sp>
@@ -16620,7 +16697,9 @@
           <p:txBody>
             <a:bodyPr wrap="square" lIns="0" tIns="0" rIns="0" bIns="0" rtlCol="0"/>
             <a:lstStyle/>
-            <a:p/>
+            <a:p>
+              <a:endParaRPr/>
+            </a:p>
           </p:txBody>
         </p:sp>
       </p:grpSp>
@@ -16637,9 +16716,11 @@
         <p:spPr/>
         <p:txBody>
           <a:bodyPr/>
+          <a:lstStyle/>
           <a:p>
             <a:fld id="{B6F15528-21DE-4FAA-801E-634DDDAF4B2B}" type="slidenum">
               <a:rPr/>
+              <a:t>8</a:t>
             </a:fld>
             <a:endParaRPr/>
           </a:p>
@@ -16677,7 +16758,7 @@
           <p:nvPr/>
         </p:nvPicPr>
         <p:blipFill>
-          <a:blip r:embed="rId1" cstate="print"/>
+          <a:blip r:embed="rId2" cstate="print"/>
           <a:stretch>
             <a:fillRect/>
           </a:stretch>
@@ -16713,7 +16794,7 @@
             <p:nvPr/>
           </p:nvPicPr>
           <p:blipFill>
-            <a:blip r:embed="rId2" cstate="print"/>
+            <a:blip r:embed="rId3" cstate="print"/>
             <a:stretch>
               <a:fillRect/>
             </a:stretch>
@@ -16735,7 +16816,7 @@
             <p:nvPr/>
           </p:nvPicPr>
           <p:blipFill>
-            <a:blip r:embed="rId3" cstate="print"/>
+            <a:blip r:embed="rId4" cstate="print"/>
             <a:stretch>
               <a:fillRect/>
             </a:stretch>
@@ -16758,7 +16839,7 @@
           <p:nvPr/>
         </p:nvPicPr>
         <p:blipFill>
-          <a:blip r:embed="rId4" cstate="print"/>
+          <a:blip r:embed="rId5" cstate="print"/>
           <a:stretch>
             <a:fillRect/>
           </a:stretch>
@@ -16794,7 +16875,7 @@
             <p:nvPr/>
           </p:nvPicPr>
           <p:blipFill>
-            <a:blip r:embed="rId5" cstate="print"/>
+            <a:blip r:embed="rId6" cstate="print"/>
             <a:stretch>
               <a:fillRect/>
             </a:stretch>
@@ -16816,7 +16897,7 @@
             <p:nvPr/>
           </p:nvPicPr>
           <p:blipFill>
-            <a:blip r:embed="rId6" cstate="print"/>
+            <a:blip r:embed="rId7" cstate="print"/>
             <a:stretch>
               <a:fillRect/>
             </a:stretch>
@@ -16839,7 +16920,7 @@
           <p:nvPr/>
         </p:nvPicPr>
         <p:blipFill>
-          <a:blip r:embed="rId7" cstate="print"/>
+          <a:blip r:embed="rId8" cstate="print"/>
           <a:stretch>
             <a:fillRect/>
           </a:stretch>
@@ -16971,11 +17052,6 @@
               </a:rPr>
               <a:t>;</a:t>
             </a:r>
-            <a:endParaRPr dirty="0">
-              <a:solidFill>
-                <a:srgbClr val="675BA7"/>
-              </a:solidFill>
-            </a:endParaRPr>
           </a:p>
         </p:txBody>
       </p:sp>
@@ -16986,7 +17062,7 @@
           <p:nvPr/>
         </p:nvPicPr>
         <p:blipFill>
-          <a:blip r:embed="rId8" cstate="print"/>
+          <a:blip r:embed="rId9" cstate="print"/>
           <a:stretch>
             <a:fillRect/>
           </a:stretch>
@@ -17008,7 +17084,7 @@
           <p:nvPr/>
         </p:nvPicPr>
         <p:blipFill>
-          <a:blip r:embed="rId9" cstate="print"/>
+          <a:blip r:embed="rId10" cstate="print"/>
           <a:stretch>
             <a:fillRect/>
           </a:stretch>
@@ -17036,9 +17112,11 @@
         <p:spPr/>
         <p:txBody>
           <a:bodyPr/>
+          <a:lstStyle/>
           <a:p>
             <a:fld id="{B6F15528-21DE-4FAA-801E-634DDDAF4B2B}" type="slidenum">
               <a:rPr/>
+              <a:t>9</a:t>
             </a:fld>
             <a:endParaRPr/>
           </a:p>
@@ -17330,6 +17408,8 @@
       </a:bgFillStyleLst>
     </a:fmtScheme>
   </a:themeElements>
+  <a:objectDefaults/>
+  <a:extraClrSchemeLst/>
   <a:extLst>
     <a:ext uri="{05A4C25C-085E-4340-85A3-A5531E510DB2}">
       <thm15:themeFamily xmlns:thm15="http://schemas.microsoft.com/office/thememl/2012/main" name="Office Theme" id="{62F939B6-93AF-4DB8-9C6B-D6C7DFDC589F}" vid="{4A3C46E8-61CC-4603-A589-7422A47A8E4A}"/>
@@ -17589,6 +17669,8 @@
       </a:bgFillStyleLst>
     </a:fmtScheme>
   </a:themeElements>
+  <a:objectDefaults/>
+  <a:extraClrSchemeLst/>
   <a:extLst>
     <a:ext uri="{05A4C25C-085E-4340-85A3-A5531E510DB2}">
       <thm15:themeFamily xmlns:thm15="http://schemas.microsoft.com/office/thememl/2012/main" name="Office Theme" id="{62F939B6-93AF-4DB8-9C6B-D6C7DFDC589F}" vid="{4A3C46E8-61CC-4603-A589-7422A47A8E4A}"/>

</xml_diff>